<commit_message>
renamed blog post 5 based on keyword research updated slides
</commit_message>
<xml_diff>
--- a/slides/slides.pptx
+++ b/slides/slides.pptx
@@ -198,7 +198,7 @@
           <a:p>
             <a:fld id="{4BF2D68D-8579-7D4D-BDA1-90F3C5A0B40C}" type="datetimeFigureOut">
               <a:rPr lang="en-US" smtClean="0"/>
-              <a:t>3/1/20</a:t>
+              <a:t>3/2/20</a:t>
             </a:fld>
             <a:endParaRPr lang="en-US"/>
           </a:p>
@@ -509,7 +509,18 @@
           <a:bodyPr/>
           <a:lstStyle/>
           <a:p>
-            <a:endParaRPr lang="en-US"/>
+            <a:r>
+              <a:rPr lang="en-US" dirty="0"/>
+              <a:t>Hey everyone it’s Josh Duffney. In this lab we’ll be diving into using ansible with azure. You’ll learn how to install ansible on an azure Linux </a:t>
+            </a:r>
+            <a:r>
+              <a:rPr lang="en-US" dirty="0" err="1"/>
+              <a:t>vm</a:t>
+            </a:r>
+            <a:r>
+              <a:rPr lang="en-US" dirty="0"/>
+              <a:t> as well as how to use it within a container running locally on your laptop. After that you’ll learn how to connect ansible to azure. You will also learn how to create Ansible playbooks that will deploy and configure virtual machines in azure.</a:t>
+            </a:r>
           </a:p>
         </p:txBody>
       </p:sp>
@@ -593,7 +604,18 @@
           <a:bodyPr/>
           <a:lstStyle/>
           <a:p>
-            <a:endParaRPr lang="en-US" dirty="0"/>
+            <a:r>
+              <a:rPr lang="en-US" dirty="0"/>
+              <a:t>Some prerequisites before you get started are an active azure subscription, an </a:t>
+            </a:r>
+            <a:r>
+              <a:rPr lang="en-US" dirty="0" err="1"/>
+              <a:t>ssh</a:t>
+            </a:r>
+            <a:r>
+              <a:rPr lang="en-US" dirty="0"/>
+              <a:t> client, Visual studio code and docker desktop installed. With that out of the way let’s get started!</a:t>
+            </a:r>
           </a:p>
         </p:txBody>
       </p:sp>
@@ -780,7 +802,7 @@
           <a:p>
             <a:fld id="{6A891190-F3FA-F445-9D6C-1B78F87FBF61}" type="datetimeFigureOut">
               <a:rPr lang="en-US" smtClean="0"/>
-              <a:t>3/1/20</a:t>
+              <a:t>3/2/20</a:t>
             </a:fld>
             <a:endParaRPr lang="en-US"/>
           </a:p>
@@ -978,7 +1000,7 @@
           <a:p>
             <a:fld id="{6A891190-F3FA-F445-9D6C-1B78F87FBF61}" type="datetimeFigureOut">
               <a:rPr lang="en-US" smtClean="0"/>
-              <a:t>3/1/20</a:t>
+              <a:t>3/2/20</a:t>
             </a:fld>
             <a:endParaRPr lang="en-US"/>
           </a:p>
@@ -1186,7 +1208,7 @@
           <a:p>
             <a:fld id="{6A891190-F3FA-F445-9D6C-1B78F87FBF61}" type="datetimeFigureOut">
               <a:rPr lang="en-US" smtClean="0"/>
-              <a:t>3/1/20</a:t>
+              <a:t>3/2/20</a:t>
             </a:fld>
             <a:endParaRPr lang="en-US"/>
           </a:p>
@@ -1557,7 +1579,7 @@
           <a:p>
             <a:fld id="{6A891190-F3FA-F445-9D6C-1B78F87FBF61}" type="datetimeFigureOut">
               <a:rPr lang="en-US" smtClean="0"/>
-              <a:t>3/1/20</a:t>
+              <a:t>3/2/20</a:t>
             </a:fld>
             <a:endParaRPr lang="en-US"/>
           </a:p>
@@ -1832,7 +1854,7 @@
           <a:p>
             <a:fld id="{6A891190-F3FA-F445-9D6C-1B78F87FBF61}" type="datetimeFigureOut">
               <a:rPr lang="en-US" smtClean="0"/>
-              <a:t>3/1/20</a:t>
+              <a:t>3/2/20</a:t>
             </a:fld>
             <a:endParaRPr lang="en-US"/>
           </a:p>
@@ -2097,7 +2119,7 @@
           <a:p>
             <a:fld id="{6A891190-F3FA-F445-9D6C-1B78F87FBF61}" type="datetimeFigureOut">
               <a:rPr lang="en-US" smtClean="0"/>
-              <a:t>3/1/20</a:t>
+              <a:t>3/2/20</a:t>
             </a:fld>
             <a:endParaRPr lang="en-US"/>
           </a:p>
@@ -2509,7 +2531,7 @@
           <a:p>
             <a:fld id="{6A891190-F3FA-F445-9D6C-1B78F87FBF61}" type="datetimeFigureOut">
               <a:rPr lang="en-US" smtClean="0"/>
-              <a:t>3/1/20</a:t>
+              <a:t>3/2/20</a:t>
             </a:fld>
             <a:endParaRPr lang="en-US"/>
           </a:p>
@@ -2650,7 +2672,7 @@
           <a:p>
             <a:fld id="{6A891190-F3FA-F445-9D6C-1B78F87FBF61}" type="datetimeFigureOut">
               <a:rPr lang="en-US" smtClean="0"/>
-              <a:t>3/1/20</a:t>
+              <a:t>3/2/20</a:t>
             </a:fld>
             <a:endParaRPr lang="en-US"/>
           </a:p>
@@ -2763,7 +2785,7 @@
           <a:p>
             <a:fld id="{6A891190-F3FA-F445-9D6C-1B78F87FBF61}" type="datetimeFigureOut">
               <a:rPr lang="en-US" smtClean="0"/>
-              <a:t>3/1/20</a:t>
+              <a:t>3/2/20</a:t>
             </a:fld>
             <a:endParaRPr lang="en-US"/>
           </a:p>
@@ -3074,7 +3096,7 @@
           <a:p>
             <a:fld id="{6A891190-F3FA-F445-9D6C-1B78F87FBF61}" type="datetimeFigureOut">
               <a:rPr lang="en-US" smtClean="0"/>
-              <a:t>3/1/20</a:t>
+              <a:t>3/2/20</a:t>
             </a:fld>
             <a:endParaRPr lang="en-US"/>
           </a:p>
@@ -3362,7 +3384,7 @@
           <a:p>
             <a:fld id="{6A891190-F3FA-F445-9D6C-1B78F87FBF61}" type="datetimeFigureOut">
               <a:rPr lang="en-US" smtClean="0"/>
-              <a:t>3/1/20</a:t>
+              <a:t>3/2/20</a:t>
             </a:fld>
             <a:endParaRPr lang="en-US"/>
           </a:p>
@@ -3603,7 +3625,7 @@
           <a:p>
             <a:fld id="{6A891190-F3FA-F445-9D6C-1B78F87FBF61}" type="datetimeFigureOut">
               <a:rPr lang="en-US" smtClean="0"/>
-              <a:t>3/1/20</a:t>
+              <a:t>3/2/20</a:t>
             </a:fld>
             <a:endParaRPr lang="en-US"/>
           </a:p>
@@ -4262,21 +4284,8 @@
                   <a:schemeClr val="tx1"/>
                 </a:solidFill>
               </a:rPr>
-              <a:t>Josh </a:t>
-            </a:r>
-            <a:r>
-              <a:rPr lang="en-US" dirty="0" err="1">
-                <a:solidFill>
-                  <a:schemeClr val="tx1"/>
-                </a:solidFill>
-              </a:rPr>
-              <a:t>Duffney</a:t>
-            </a:r>
-            <a:endParaRPr lang="en-US" dirty="0">
-              <a:solidFill>
-                <a:schemeClr val="tx1"/>
-              </a:solidFill>
-            </a:endParaRPr>
+              <a:t>Josh Duffney</a:t>
+            </a:r>
           </a:p>
         </p:txBody>
       </p:sp>
@@ -4483,20 +4492,12 @@
           </a:lstStyle>
           <a:p>
             <a:r>
-              <a:rPr lang="en-US" sz="1800" dirty="0" err="1">
-                <a:solidFill>
-                  <a:schemeClr val="tx1"/>
-                </a:solidFill>
-              </a:rPr>
-              <a:t>Cloudskills</a:t>
-            </a:r>
-            <a:r>
               <a:rPr lang="en-US" sz="1800" dirty="0">
                 <a:solidFill>
                   <a:schemeClr val="tx1"/>
                 </a:solidFill>
               </a:rPr>
-              <a:t> Community Contributor</a:t>
+              <a:t>Cloudskills Community Contributor</a:t>
             </a:r>
           </a:p>
         </p:txBody>
@@ -4607,7 +4608,7 @@
         <p:spPr>
           <a:xfrm>
             <a:off x="621738" y="1125611"/>
-            <a:ext cx="10948530" cy="2862322"/>
+            <a:ext cx="10948530" cy="3447098"/>
           </a:xfrm>
           <a:prstGeom prst="rect">
             <a:avLst/>
@@ -4651,6 +4652,25 @@
                 <a:cs typeface="Consolas" panose="020B0609020204030204" pitchFamily="49" charset="0"/>
               </a:rPr>
               <a:t>Azure Subscription</a:t>
+            </a:r>
+          </a:p>
+          <a:p>
+            <a:pPr marL="457200" indent="-457200">
+              <a:spcBef>
+                <a:spcPts val="600"/>
+              </a:spcBef>
+              <a:spcAft>
+                <a:spcPts val="600"/>
+              </a:spcAft>
+              <a:buFont typeface="Arial" panose="020B0604020202020204" pitchFamily="34" charset="0"/>
+              <a:buChar char="•"/>
+            </a:pPr>
+            <a:r>
+              <a:rPr lang="en-US" sz="2800" dirty="0">
+                <a:latin typeface="Consolas" panose="020B0609020204030204" pitchFamily="49" charset="0"/>
+                <a:cs typeface="Consolas" panose="020B0609020204030204" pitchFamily="49" charset="0"/>
+              </a:rPr>
+              <a:t>SSH Client</a:t>
             </a:r>
           </a:p>
           <a:p>

</xml_diff>